<commit_message>
Small fixes after the first lecture
</commit_message>
<xml_diff>
--- a/unit1/Julia.pptx
+++ b/unit1/Julia.pptx
@@ -375,7 +375,7 @@
             <a:fld id="{AA592FF2-A4BD-4E98-AC76-A10007E04C10}" type="datetimeFigureOut">
               <a:rPr lang="en-US" smtClean="0"/>
               <a:pPr/>
-              <a:t>10/13/25</a:t>
+              <a:t>10/15/25</a:t>
             </a:fld>
             <a:endParaRPr lang="en-US" dirty="0"/>
           </a:p>
@@ -1232,7 +1232,7 @@
             <a:fld id="{AA592FF2-A4BD-4E98-AC76-A10007E04C10}" type="datetimeFigureOut">
               <a:rPr lang="en-US" smtClean="0"/>
               <a:pPr/>
-              <a:t>10/13/25</a:t>
+              <a:t>10/15/25</a:t>
             </a:fld>
             <a:endParaRPr lang="en-US" dirty="0"/>
           </a:p>
@@ -16992,7 +16992,7 @@
             </a:r>
             <a:r>
               <a:rPr lang="en-GB" dirty="0"/>
-              <a:t> (i.e., hierarchical relationships between types are explicitly declared</a:t>
+              <a:t> (i.e., hierarchical relationships between types are explicitly declared)</a:t>
             </a:r>
           </a:p>
           <a:p>

</xml_diff>